<commit_message>
lecture notes for Big Data added and some additional pdfs and slides
</commit_message>
<xml_diff>
--- a/CSED490U Blockchain & Cryptocurrency/CSED490UAssignment2.pptx
+++ b/CSED490U Blockchain & Cryptocurrency/CSED490UAssignment2.pptx
@@ -201,7 +201,7 @@
           <a:p>
             <a:fld id="{1A123D7A-7BBA-4B7F-8EE0-1CCAEDA9E409}" type="datetimeFigureOut">
               <a:rPr lang="en-GB" smtClean="0"/>
-              <a:t>16/09/2018</a:t>
+              <a:t>18/09/2018</a:t>
             </a:fld>
             <a:endParaRPr lang="en-GB"/>
           </a:p>
@@ -657,7 +657,7 @@
           <a:p>
             <a:fld id="{914286D4-6F11-4818-AE26-7421D3D2D909}" type="datetime1">
               <a:rPr lang="en-US" smtClean="0"/>
-              <a:t>9/16/2018</a:t>
+              <a:t>9/18/2018</a:t>
             </a:fld>
             <a:endParaRPr lang="en-US" dirty="0"/>
           </a:p>
@@ -996,7 +996,7 @@
           <a:p>
             <a:fld id="{20EAFCFF-81CA-4E5A-8731-08F8B6217349}" type="datetime1">
               <a:rPr lang="en-US" smtClean="0"/>
-              <a:t>9/16/2018</a:t>
+              <a:t>9/18/2018</a:t>
             </a:fld>
             <a:endParaRPr lang="en-US" dirty="0"/>
           </a:p>
@@ -1398,7 +1398,7 @@
           <a:p>
             <a:fld id="{FCE109EF-D0BA-44B6-8CAB-BAFF1B2E81BF}" type="datetime1">
               <a:rPr lang="en-US" smtClean="0"/>
-              <a:t>9/16/2018</a:t>
+              <a:t>9/18/2018</a:t>
             </a:fld>
             <a:endParaRPr lang="en-US" dirty="0"/>
           </a:p>
@@ -1735,7 +1735,7 @@
           <a:p>
             <a:fld id="{55C98F44-F198-4604-96F2-1B8E177D9E41}" type="datetime1">
               <a:rPr lang="en-US" smtClean="0"/>
-              <a:t>9/16/2018</a:t>
+              <a:t>9/18/2018</a:t>
             </a:fld>
             <a:endParaRPr lang="en-US" dirty="0"/>
           </a:p>
@@ -2056,7 +2056,7 @@
           <a:p>
             <a:fld id="{EAB9969E-B56D-4A62-9D65-D0EF50A45C03}" type="datetime1">
               <a:rPr lang="en-US" smtClean="0"/>
-              <a:t>9/16/2018</a:t>
+              <a:t>9/18/2018</a:t>
             </a:fld>
             <a:endParaRPr lang="en-US" dirty="0"/>
           </a:p>
@@ -2453,7 +2453,7 @@
           <a:p>
             <a:fld id="{F122AB0F-0A68-4F31-8250-F9C7C2F244E7}" type="datetime1">
               <a:rPr lang="en-US" smtClean="0"/>
-              <a:t>9/16/2018</a:t>
+              <a:t>9/18/2018</a:t>
             </a:fld>
             <a:endParaRPr lang="en-US" dirty="0"/>
           </a:p>
@@ -2711,7 +2711,7 @@
           <a:p>
             <a:fld id="{7429E788-391E-4A5F-8938-4AE58C10344F}" type="datetime1">
               <a:rPr lang="en-US" smtClean="0"/>
-              <a:t>9/16/2018</a:t>
+              <a:t>9/18/2018</a:t>
             </a:fld>
             <a:endParaRPr lang="en-US" dirty="0"/>
           </a:p>
@@ -2974,7 +2974,7 @@
           <a:p>
             <a:fld id="{CE9D5716-7E25-407E-AFA4-D662715F5F24}" type="datetime1">
               <a:rPr lang="en-US" smtClean="0"/>
-              <a:t>9/16/2018</a:t>
+              <a:t>9/18/2018</a:t>
             </a:fld>
             <a:endParaRPr lang="en-US" dirty="0"/>
           </a:p>
@@ -3237,7 +3237,7 @@
           <a:p>
             <a:fld id="{2900F943-D7B1-40DB-997D-759AD7AA2298}" type="datetime1">
               <a:rPr lang="en-US" smtClean="0"/>
-              <a:t>9/16/2018</a:t>
+              <a:t>9/18/2018</a:t>
             </a:fld>
             <a:endParaRPr lang="en-US" dirty="0"/>
           </a:p>
@@ -3567,7 +3567,7 @@
           <a:p>
             <a:fld id="{466EE01E-D455-459E-9772-1213548A4168}" type="datetime1">
               <a:rPr lang="en-US" smtClean="0"/>
-              <a:t>9/16/2018</a:t>
+              <a:t>9/18/2018</a:t>
             </a:fld>
             <a:endParaRPr lang="en-US" dirty="0"/>
           </a:p>
@@ -3891,7 +3891,7 @@
           <a:p>
             <a:fld id="{6F844406-1FFC-4E7F-AA94-8DDB6367C1A0}" type="datetime1">
               <a:rPr lang="en-US" smtClean="0"/>
-              <a:t>9/16/2018</a:t>
+              <a:t>9/18/2018</a:t>
             </a:fld>
             <a:endParaRPr lang="en-US" dirty="0"/>
           </a:p>
@@ -4349,7 +4349,7 @@
           <a:p>
             <a:fld id="{C2F42643-A80B-4B2F-B15F-39C1597ACDAC}" type="datetime1">
               <a:rPr lang="en-US" smtClean="0"/>
-              <a:t>9/16/2018</a:t>
+              <a:t>9/18/2018</a:t>
             </a:fld>
             <a:endParaRPr lang="en-US" dirty="0"/>
           </a:p>
@@ -4555,7 +4555,7 @@
           <a:p>
             <a:fld id="{01656897-840D-4D2C-ADE2-873E7839CD19}" type="datetime1">
               <a:rPr lang="en-US" smtClean="0"/>
-              <a:t>9/16/2018</a:t>
+              <a:t>9/18/2018</a:t>
             </a:fld>
             <a:endParaRPr lang="en-US" dirty="0"/>
           </a:p>
@@ -4733,7 +4733,7 @@
           <a:p>
             <a:fld id="{EAA853EC-4BDD-44CF-AC45-ECA995656285}" type="datetime1">
               <a:rPr lang="en-US" smtClean="0"/>
-              <a:t>9/16/2018</a:t>
+              <a:t>9/18/2018</a:t>
             </a:fld>
             <a:endParaRPr lang="en-US" dirty="0"/>
           </a:p>
@@ -5067,7 +5067,7 @@
           <a:p>
             <a:fld id="{DFF90943-61F0-4964-AAE9-E9DB8A1CBCE9}" type="datetime1">
               <a:rPr lang="en-US" smtClean="0"/>
-              <a:t>9/16/2018</a:t>
+              <a:t>9/18/2018</a:t>
             </a:fld>
             <a:endParaRPr lang="en-US" dirty="0"/>
           </a:p>
@@ -5413,7 +5413,7 @@
           <a:p>
             <a:fld id="{C1D599E1-BDC7-4C51-9B59-430FC1A7373B}" type="datetime1">
               <a:rPr lang="en-US" smtClean="0"/>
-              <a:t>9/16/2018</a:t>
+              <a:t>9/18/2018</a:t>
             </a:fld>
             <a:endParaRPr lang="en-US" dirty="0"/>
           </a:p>
@@ -7531,7 +7531,7 @@
           <a:p>
             <a:fld id="{34034008-7D90-436F-A39E-2787F67FA213}" type="datetime1">
               <a:rPr lang="en-US" smtClean="0"/>
-              <a:t>9/16/2018</a:t>
+              <a:t>9/18/2018</a:t>
             </a:fld>
             <a:endParaRPr lang="en-US" dirty="0"/>
           </a:p>
@@ -8144,6 +8144,13 @@
   <p:clrMapOvr>
     <a:masterClrMapping/>
   </p:clrMapOvr>
+  <p:timing>
+    <p:tnLst>
+      <p:par>
+        <p:cTn id="1" dur="indefinite" restart="never" nodeType="tmRoot"/>
+      </p:par>
+    </p:tnLst>
+  </p:timing>
 </p:sld>
 </file>
 
@@ -8298,6 +8305,13 @@
   <p:clrMapOvr>
     <a:masterClrMapping/>
   </p:clrMapOvr>
+  <p:timing>
+    <p:tnLst>
+      <p:par>
+        <p:cTn id="1" dur="indefinite" restart="never" nodeType="tmRoot"/>
+      </p:par>
+    </p:tnLst>
+  </p:timing>
 </p:sld>
 </file>
 
@@ -8397,6 +8411,13 @@
   <p:clrMapOvr>
     <a:masterClrMapping/>
   </p:clrMapOvr>
+  <p:timing>
+    <p:tnLst>
+      <p:par>
+        <p:cTn id="1" dur="indefinite" restart="never" nodeType="tmRoot"/>
+      </p:par>
+    </p:tnLst>
+  </p:timing>
 </p:sld>
 </file>
 
@@ -8472,6 +8493,7 @@
               <a:rPr lang="en-GB" dirty="0" smtClean="0"/>
               <a:t>logs</a:t>
             </a:r>
+            <a:endParaRPr lang="en-GB" dirty="0" smtClean="0"/>
           </a:p>
           <a:p>
             <a:endParaRPr lang="en-GB" dirty="0"/>
@@ -8479,32 +8501,15 @@
           <a:p>
             <a:r>
               <a:rPr lang="en-GB" dirty="0" smtClean="0"/>
-              <a:t>Build on top on </a:t>
-            </a:r>
-            <a:r>
-              <a:rPr lang="en-GB" dirty="0" err="1" smtClean="0"/>
-              <a:t>Ethereum</a:t>
+              <a:t>Owned by a single </a:t>
             </a:r>
             <a:r>
               <a:rPr lang="en-GB" dirty="0" smtClean="0"/>
-              <a:t> technology and use </a:t>
-            </a:r>
-            <a:r>
-              <a:rPr lang="en-GB" dirty="0" err="1" smtClean="0"/>
-              <a:t>PoS</a:t>
+              <a:t>company/organization, </a:t>
             </a:r>
             <a:r>
               <a:rPr lang="en-GB" dirty="0" smtClean="0"/>
-              <a:t> consensus algorithm</a:t>
-            </a:r>
-          </a:p>
-          <a:p>
-            <a:endParaRPr lang="en-GB" dirty="0"/>
-          </a:p>
-          <a:p>
-            <a:r>
-              <a:rPr lang="en-GB" dirty="0" smtClean="0"/>
-              <a:t>Owned by a single company, hence Private </a:t>
+              <a:t>hence Private </a:t>
             </a:r>
             <a:r>
               <a:rPr lang="en-GB" dirty="0" err="1" smtClean="0"/>
@@ -8536,6 +8541,13 @@
   <p:clrMapOvr>
     <a:masterClrMapping/>
   </p:clrMapOvr>
+  <p:timing>
+    <p:tnLst>
+      <p:par>
+        <p:cTn id="1" dur="indefinite" restart="never" nodeType="tmRoot"/>
+      </p:par>
+    </p:tnLst>
+  </p:timing>
 </p:sld>
 </file>
 
@@ -8618,23 +8630,51 @@
             <a:pPr lvl="1"/>
             <a:r>
               <a:rPr lang="en-GB" dirty="0" smtClean="0"/>
-              <a:t>Interface development (Perhaps web based)</a:t>
+              <a:t>Interface development </a:t>
+            </a:r>
+            <a:r>
+              <a:rPr lang="en-GB" dirty="0" smtClean="0"/>
+              <a:t>(Web </a:t>
+            </a:r>
+            <a:r>
+              <a:rPr lang="en-GB" dirty="0" smtClean="0"/>
+              <a:t>based)</a:t>
             </a:r>
           </a:p>
           <a:p>
             <a:pPr lvl="1"/>
             <a:r>
               <a:rPr lang="en-GB" dirty="0" smtClean="0"/>
-              <a:t>Backend development (Perhaps using </a:t>
+              <a:t>Backend development </a:t>
+            </a:r>
+            <a:r>
+              <a:rPr lang="en-GB" dirty="0" smtClean="0"/>
+              <a:t>(</a:t>
             </a:r>
             <a:r>
               <a:rPr lang="en-GB" dirty="0" err="1" smtClean="0"/>
-              <a:t>Ethereum</a:t>
+              <a:t>Blockchain</a:t>
+            </a:r>
+            <a:r>
+              <a:rPr lang="en-GB" dirty="0" smtClean="0"/>
+              <a:t> technology</a:t>
             </a:r>
             <a:r>
               <a:rPr lang="en-GB" dirty="0" smtClean="0"/>
               <a:t>)</a:t>
             </a:r>
+          </a:p>
+          <a:p>
+            <a:pPr lvl="1"/>
+            <a:r>
+              <a:rPr lang="en-GB" dirty="0" smtClean="0"/>
+              <a:t>Team members will switch between tasks as per </a:t>
+            </a:r>
+            <a:r>
+              <a:rPr lang="en-GB" smtClean="0"/>
+              <a:t>their expertise</a:t>
+            </a:r>
+            <a:endParaRPr lang="en-GB" dirty="0" smtClean="0"/>
           </a:p>
         </p:txBody>
       </p:sp>
@@ -8648,6 +8688,13 @@
   <p:clrMapOvr>
     <a:masterClrMapping/>
   </p:clrMapOvr>
+  <p:timing>
+    <p:tnLst>
+      <p:par>
+        <p:cTn id="1" dur="indefinite" restart="never" nodeType="tmRoot"/>
+      </p:par>
+    </p:tnLst>
+  </p:timing>
 </p:sld>
 </file>
 

</xml_diff>